<commit_message>
upload checkpoints and update README
</commit_message>
<xml_diff>
--- a/report/강화학습 프로젝트 보고서_한민성.pptx
+++ b/report/강화학습 프로젝트 보고서_한민성.pptx
@@ -31338,8 +31338,8 @@
         </p:nvSpPr>
         <p:spPr>
           <a:xfrm>
-            <a:off x="4441498" y="4722133"/>
-            <a:ext cx="5289551" cy="400110"/>
+            <a:off x="4084656" y="4634129"/>
+            <a:ext cx="5158811" cy="461665"/>
           </a:xfrm>
           <a:prstGeom prst="rect">
             <a:avLst/>
@@ -31353,28 +31353,28 @@
           <a:lstStyle/>
           <a:p>
             <a:r>
-              <a:rPr lang="ko-KR" altLang="en-US" sz="1000" dirty="0">
+              <a:rPr lang="ko-KR" altLang="en-US" sz="800" dirty="0">
                 <a:latin typeface="LG Smart UI Regular" panose="020B0500000101010101" pitchFamily="34" charset="-127"/>
                 <a:ea typeface="LG Smart UI Regular" panose="020B0500000101010101" pitchFamily="34" charset="-127"/>
               </a:rPr>
               <a:t>모델 </a:t>
             </a:r>
             <a:r>
-              <a:rPr lang="en-US" altLang="ko-KR" sz="1000" dirty="0">
+              <a:rPr lang="en-US" altLang="ko-KR" sz="800" dirty="0">
                 <a:latin typeface="LG Smart UI Regular" panose="020B0500000101010101" pitchFamily="34" charset="-127"/>
                 <a:ea typeface="LG Smart UI Regular" panose="020B0500000101010101" pitchFamily="34" charset="-127"/>
               </a:rPr>
               <a:t>Checkpoint</a:t>
             </a:r>
             <a:r>
-              <a:rPr lang="ko-KR" altLang="en-US" sz="1000" dirty="0">
+              <a:rPr lang="ko-KR" altLang="en-US" sz="800" dirty="0">
                 <a:latin typeface="LG Smart UI Regular" panose="020B0500000101010101" pitchFamily="34" charset="-127"/>
                 <a:ea typeface="LG Smart UI Regular" panose="020B0500000101010101" pitchFamily="34" charset="-127"/>
               </a:rPr>
               <a:t>가 필요하시거나 추가 문의 사항 있으시면 메일로 연락주시면 감사드리겠습니다</a:t>
             </a:r>
             <a:r>
-              <a:rPr lang="en-US" altLang="ko-KR" sz="1000" dirty="0">
+              <a:rPr lang="en-US" altLang="ko-KR" sz="800" dirty="0">
                 <a:latin typeface="LG Smart UI Regular" panose="020B0500000101010101" pitchFamily="34" charset="-127"/>
                 <a:ea typeface="LG Smart UI Regular" panose="020B0500000101010101" pitchFamily="34" charset="-127"/>
               </a:rPr>
@@ -31383,7 +31383,42 @@
           </a:p>
           <a:p>
             <a:r>
-              <a:rPr lang="en-US" altLang="ko-KR" sz="1000" dirty="0">
+              <a:rPr lang="en-US" altLang="ko-KR" sz="800" dirty="0">
+                <a:latin typeface="LG Smart UI Regular" panose="020B0500000101010101" pitchFamily="34" charset="-127"/>
+                <a:ea typeface="LG Smart UI Regular" panose="020B0500000101010101" pitchFamily="34" charset="-127"/>
+              </a:rPr>
+              <a:t>Checkpoints </a:t>
+            </a:r>
+            <a:r>
+              <a:rPr lang="ko-KR" altLang="en-US" sz="800" dirty="0">
+                <a:latin typeface="LG Smart UI Regular" panose="020B0500000101010101" pitchFamily="34" charset="-127"/>
+                <a:ea typeface="LG Smart UI Regular" panose="020B0500000101010101" pitchFamily="34" charset="-127"/>
+              </a:rPr>
+              <a:t>저장소</a:t>
+            </a:r>
+            <a:r>
+              <a:rPr lang="en-US" altLang="ko-KR" sz="800" dirty="0">
+                <a:latin typeface="LG Smart UI Regular" panose="020B0500000101010101" pitchFamily="34" charset="-127"/>
+                <a:ea typeface="LG Smart UI Regular" panose="020B0500000101010101" pitchFamily="34" charset="-127"/>
+              </a:rPr>
+              <a:t>: </a:t>
+            </a:r>
+            <a:r>
+              <a:rPr lang="en-US" altLang="ko-KR" sz="800" dirty="0">
+                <a:latin typeface="LG Smart UI Regular" panose="020B0500000101010101" pitchFamily="34" charset="-127"/>
+                <a:ea typeface="LG Smart UI Regular" panose="020B0500000101010101" pitchFamily="34" charset="-127"/>
+                <a:hlinkClick r:id="rId6"/>
+              </a:rPr>
+              <a:t>https://drive.google.com/drive/folders/1AXFPK7xQpnUrl42ke9HL9YrVziXlabm1?usp=sharing</a:t>
+            </a:r>
+            <a:br>
+              <a:rPr lang="en-US" altLang="ko-KR" sz="800" dirty="0">
+                <a:latin typeface="LG Smart UI Regular" panose="020B0500000101010101" pitchFamily="34" charset="-127"/>
+                <a:ea typeface="LG Smart UI Regular" panose="020B0500000101010101" pitchFamily="34" charset="-127"/>
+              </a:rPr>
+            </a:br>
+            <a:r>
+              <a:rPr lang="en-US" altLang="ko-KR" sz="800" dirty="0">
                 <a:latin typeface="LG Smart UI Regular" panose="020B0500000101010101" pitchFamily="34" charset="-127"/>
                 <a:ea typeface="LG Smart UI Regular" panose="020B0500000101010101" pitchFamily="34" charset="-127"/>
               </a:rPr>
@@ -36057,10 +36092,10 @@
       </p:sp>
       <p:sp>
         <p:nvSpPr>
-          <p:cNvPr id="3" name="TextBox 2">
+          <p:cNvPr id="2" name="TextBox 1">
             <a:extLst>
               <a:ext uri="{FF2B5EF4-FFF2-40B4-BE49-F238E27FC236}">
-                <a16:creationId xmlns:a16="http://schemas.microsoft.com/office/drawing/2014/main" id="{40C8ECA7-BD76-D6F7-CF3B-B0EF20C9E066}"/>
+                <a16:creationId xmlns:a16="http://schemas.microsoft.com/office/drawing/2014/main" id="{E1BD1221-E3FE-214E-E9BC-CA4231CCDB62}"/>
               </a:ext>
             </a:extLst>
           </p:cNvPr>
@@ -36069,8 +36104,8 @@
         </p:nvSpPr>
         <p:spPr>
           <a:xfrm>
-            <a:off x="4346248" y="4722985"/>
-            <a:ext cx="5289551" cy="400110"/>
+            <a:off x="4084656" y="4634129"/>
+            <a:ext cx="5158811" cy="461665"/>
           </a:xfrm>
           <a:prstGeom prst="rect">
             <a:avLst/>
@@ -36084,28 +36119,28 @@
           <a:lstStyle/>
           <a:p>
             <a:r>
-              <a:rPr lang="ko-KR" altLang="en-US" sz="1000" dirty="0">
+              <a:rPr lang="ko-KR" altLang="en-US" sz="800" dirty="0">
                 <a:latin typeface="LG Smart UI Regular" panose="020B0500000101010101" pitchFamily="34" charset="-127"/>
                 <a:ea typeface="LG Smart UI Regular" panose="020B0500000101010101" pitchFamily="34" charset="-127"/>
               </a:rPr>
               <a:t>모델 </a:t>
             </a:r>
             <a:r>
-              <a:rPr lang="en-US" altLang="ko-KR" sz="1000" dirty="0">
+              <a:rPr lang="en-US" altLang="ko-KR" sz="800" dirty="0">
                 <a:latin typeface="LG Smart UI Regular" panose="020B0500000101010101" pitchFamily="34" charset="-127"/>
                 <a:ea typeface="LG Smart UI Regular" panose="020B0500000101010101" pitchFamily="34" charset="-127"/>
               </a:rPr>
               <a:t>Checkpoint</a:t>
             </a:r>
             <a:r>
-              <a:rPr lang="ko-KR" altLang="en-US" sz="1000" dirty="0">
+              <a:rPr lang="ko-KR" altLang="en-US" sz="800" dirty="0">
                 <a:latin typeface="LG Smart UI Regular" panose="020B0500000101010101" pitchFamily="34" charset="-127"/>
                 <a:ea typeface="LG Smart UI Regular" panose="020B0500000101010101" pitchFamily="34" charset="-127"/>
               </a:rPr>
               <a:t>가 필요하시거나 추가 문의 사항 있으시면 메일로 연락주시면 감사드리겠습니다</a:t>
             </a:r>
             <a:r>
-              <a:rPr lang="en-US" altLang="ko-KR" sz="1000" dirty="0">
+              <a:rPr lang="en-US" altLang="ko-KR" sz="800" dirty="0">
                 <a:latin typeface="LG Smart UI Regular" panose="020B0500000101010101" pitchFamily="34" charset="-127"/>
                 <a:ea typeface="LG Smart UI Regular" panose="020B0500000101010101" pitchFamily="34" charset="-127"/>
               </a:rPr>
@@ -36114,7 +36149,42 @@
           </a:p>
           <a:p>
             <a:r>
-              <a:rPr lang="en-US" altLang="ko-KR" sz="1000" dirty="0">
+              <a:rPr lang="en-US" altLang="ko-KR" sz="800" dirty="0">
+                <a:latin typeface="LG Smart UI Regular" panose="020B0500000101010101" pitchFamily="34" charset="-127"/>
+                <a:ea typeface="LG Smart UI Regular" panose="020B0500000101010101" pitchFamily="34" charset="-127"/>
+              </a:rPr>
+              <a:t>Checkpoints </a:t>
+            </a:r>
+            <a:r>
+              <a:rPr lang="ko-KR" altLang="en-US" sz="800" dirty="0">
+                <a:latin typeface="LG Smart UI Regular" panose="020B0500000101010101" pitchFamily="34" charset="-127"/>
+                <a:ea typeface="LG Smart UI Regular" panose="020B0500000101010101" pitchFamily="34" charset="-127"/>
+              </a:rPr>
+              <a:t>저장소</a:t>
+            </a:r>
+            <a:r>
+              <a:rPr lang="en-US" altLang="ko-KR" sz="800" dirty="0">
+                <a:latin typeface="LG Smart UI Regular" panose="020B0500000101010101" pitchFamily="34" charset="-127"/>
+                <a:ea typeface="LG Smart UI Regular" panose="020B0500000101010101" pitchFamily="34" charset="-127"/>
+              </a:rPr>
+              <a:t>: </a:t>
+            </a:r>
+            <a:r>
+              <a:rPr lang="en-US" altLang="ko-KR" sz="800" dirty="0">
+                <a:latin typeface="LG Smart UI Regular" panose="020B0500000101010101" pitchFamily="34" charset="-127"/>
+                <a:ea typeface="LG Smart UI Regular" panose="020B0500000101010101" pitchFamily="34" charset="-127"/>
+                <a:hlinkClick r:id="rId3"/>
+              </a:rPr>
+              <a:t>https://drive.google.com/drive/folders/1AXFPK7xQpnUrl42ke9HL9YrVziXlabm1?usp=sharing</a:t>
+            </a:r>
+            <a:br>
+              <a:rPr lang="en-US" altLang="ko-KR" sz="800" dirty="0">
+                <a:latin typeface="LG Smart UI Regular" panose="020B0500000101010101" pitchFamily="34" charset="-127"/>
+                <a:ea typeface="LG Smart UI Regular" panose="020B0500000101010101" pitchFamily="34" charset="-127"/>
+              </a:rPr>
+            </a:br>
+            <a:r>
+              <a:rPr lang="en-US" altLang="ko-KR" sz="800" dirty="0">
                 <a:latin typeface="LG Smart UI Regular" panose="020B0500000101010101" pitchFamily="34" charset="-127"/>
                 <a:ea typeface="LG Smart UI Regular" panose="020B0500000101010101" pitchFamily="34" charset="-127"/>
               </a:rPr>
@@ -36217,74 +36287,6 @@
       </p:sp>
       <p:sp>
         <p:nvSpPr>
-          <p:cNvPr id="3" name="TextBox 2">
-            <a:extLst>
-              <a:ext uri="{FF2B5EF4-FFF2-40B4-BE49-F238E27FC236}">
-                <a16:creationId xmlns:a16="http://schemas.microsoft.com/office/drawing/2014/main" id="{B7C7BFFE-89A8-988A-2335-11D9E6AB37C1}"/>
-              </a:ext>
-            </a:extLst>
-          </p:cNvPr>
-          <p:cNvSpPr txBox="1"/>
-          <p:nvPr/>
-        </p:nvSpPr>
-        <p:spPr>
-          <a:xfrm>
-            <a:off x="4331176" y="4657670"/>
-            <a:ext cx="5289551" cy="400110"/>
-          </a:xfrm>
-          <a:prstGeom prst="rect">
-            <a:avLst/>
-          </a:prstGeom>
-          <a:noFill/>
-        </p:spPr>
-        <p:txBody>
-          <a:bodyPr wrap="square" rtlCol="0">
-            <a:spAutoFit/>
-          </a:bodyPr>
-          <a:lstStyle/>
-          <a:p>
-            <a:r>
-              <a:rPr lang="ko-KR" altLang="en-US" sz="1000" dirty="0">
-                <a:latin typeface="LG Smart UI Regular" panose="020B0500000101010101" pitchFamily="34" charset="-127"/>
-                <a:ea typeface="LG Smart UI Regular" panose="020B0500000101010101" pitchFamily="34" charset="-127"/>
-              </a:rPr>
-              <a:t>모델 </a:t>
-            </a:r>
-            <a:r>
-              <a:rPr lang="en-US" altLang="ko-KR" sz="1000" dirty="0">
-                <a:latin typeface="LG Smart UI Regular" panose="020B0500000101010101" pitchFamily="34" charset="-127"/>
-                <a:ea typeface="LG Smart UI Regular" panose="020B0500000101010101" pitchFamily="34" charset="-127"/>
-              </a:rPr>
-              <a:t>Checkpoint</a:t>
-            </a:r>
-            <a:r>
-              <a:rPr lang="ko-KR" altLang="en-US" sz="1000" dirty="0">
-                <a:latin typeface="LG Smart UI Regular" panose="020B0500000101010101" pitchFamily="34" charset="-127"/>
-                <a:ea typeface="LG Smart UI Regular" panose="020B0500000101010101" pitchFamily="34" charset="-127"/>
-              </a:rPr>
-              <a:t>가 필요하시거나 추가 문의 사항 있으시면 메일로 연락주시면 감사드리겠습니다</a:t>
-            </a:r>
-            <a:r>
-              <a:rPr lang="en-US" altLang="ko-KR" sz="1000" dirty="0">
-                <a:latin typeface="LG Smart UI Regular" panose="020B0500000101010101" pitchFamily="34" charset="-127"/>
-                <a:ea typeface="LG Smart UI Regular" panose="020B0500000101010101" pitchFamily="34" charset="-127"/>
-              </a:rPr>
-              <a:t>.</a:t>
-            </a:r>
-          </a:p>
-          <a:p>
-            <a:r>
-              <a:rPr lang="en-US" altLang="ko-KR" sz="1000" dirty="0">
-                <a:latin typeface="LG Smart UI Regular" panose="020B0500000101010101" pitchFamily="34" charset="-127"/>
-                <a:ea typeface="LG Smart UI Regular" panose="020B0500000101010101" pitchFamily="34" charset="-127"/>
-              </a:rPr>
-              <a:t>E-Mail: alwayzhan@gmail.com</a:t>
-            </a:r>
-          </a:p>
-        </p:txBody>
-      </p:sp>
-      <p:sp>
-        <p:nvSpPr>
           <p:cNvPr id="2" name="TextBox 1">
             <a:extLst>
               <a:ext uri="{FF2B5EF4-FFF2-40B4-BE49-F238E27FC236}">
@@ -36334,6 +36336,109 @@
                 <a:ea typeface="LG Smart UI SemiBold" panose="020B0700000101010101" pitchFamily="34" charset="-127"/>
               </a:rPr>
               <a:t>.</a:t>
+            </a:r>
+          </a:p>
+        </p:txBody>
+      </p:sp>
+      <p:sp>
+        <p:nvSpPr>
+          <p:cNvPr id="4" name="TextBox 3">
+            <a:extLst>
+              <a:ext uri="{FF2B5EF4-FFF2-40B4-BE49-F238E27FC236}">
+                <a16:creationId xmlns:a16="http://schemas.microsoft.com/office/drawing/2014/main" id="{ADD306F7-3B58-C8A7-6535-8E19A39CB9E4}"/>
+              </a:ext>
+            </a:extLst>
+          </p:cNvPr>
+          <p:cNvSpPr txBox="1"/>
+          <p:nvPr/>
+        </p:nvSpPr>
+        <p:spPr>
+          <a:xfrm>
+            <a:off x="4084656" y="4634129"/>
+            <a:ext cx="5158811" cy="461665"/>
+          </a:xfrm>
+          <a:prstGeom prst="rect">
+            <a:avLst/>
+          </a:prstGeom>
+          <a:noFill/>
+        </p:spPr>
+        <p:txBody>
+          <a:bodyPr wrap="square" rtlCol="0">
+            <a:spAutoFit/>
+          </a:bodyPr>
+          <a:lstStyle/>
+          <a:p>
+            <a:r>
+              <a:rPr lang="ko-KR" altLang="en-US" sz="800" dirty="0">
+                <a:latin typeface="LG Smart UI Regular" panose="020B0500000101010101" pitchFamily="34" charset="-127"/>
+                <a:ea typeface="LG Smart UI Regular" panose="020B0500000101010101" pitchFamily="34" charset="-127"/>
+              </a:rPr>
+              <a:t>모델 </a:t>
+            </a:r>
+            <a:r>
+              <a:rPr lang="en-US" altLang="ko-KR" sz="800" dirty="0">
+                <a:latin typeface="LG Smart UI Regular" panose="020B0500000101010101" pitchFamily="34" charset="-127"/>
+                <a:ea typeface="LG Smart UI Regular" panose="020B0500000101010101" pitchFamily="34" charset="-127"/>
+              </a:rPr>
+              <a:t>Checkpoint</a:t>
+            </a:r>
+            <a:r>
+              <a:rPr lang="ko-KR" altLang="en-US" sz="800" dirty="0">
+                <a:latin typeface="LG Smart UI Regular" panose="020B0500000101010101" pitchFamily="34" charset="-127"/>
+                <a:ea typeface="LG Smart UI Regular" panose="020B0500000101010101" pitchFamily="34" charset="-127"/>
+              </a:rPr>
+              <a:t>가 필요하시거나 추가 문의 사항 있으시면 메일로 연락주시면 감사드리겠습니다</a:t>
+            </a:r>
+            <a:r>
+              <a:rPr lang="en-US" altLang="ko-KR" sz="800" dirty="0">
+                <a:latin typeface="LG Smart UI Regular" panose="020B0500000101010101" pitchFamily="34" charset="-127"/>
+                <a:ea typeface="LG Smart UI Regular" panose="020B0500000101010101" pitchFamily="34" charset="-127"/>
+              </a:rPr>
+              <a:t>.</a:t>
+            </a:r>
+          </a:p>
+          <a:p>
+            <a:r>
+              <a:rPr lang="en-US" altLang="ko-KR" sz="800" dirty="0">
+                <a:latin typeface="LG Smart UI Regular" panose="020B0500000101010101" pitchFamily="34" charset="-127"/>
+                <a:ea typeface="LG Smart UI Regular" panose="020B0500000101010101" pitchFamily="34" charset="-127"/>
+              </a:rPr>
+              <a:t>Checkpoints </a:t>
+            </a:r>
+            <a:r>
+              <a:rPr lang="ko-KR" altLang="en-US" sz="800" dirty="0">
+                <a:latin typeface="LG Smart UI Regular" panose="020B0500000101010101" pitchFamily="34" charset="-127"/>
+                <a:ea typeface="LG Smart UI Regular" panose="020B0500000101010101" pitchFamily="34" charset="-127"/>
+              </a:rPr>
+              <a:t>저장소</a:t>
+            </a:r>
+            <a:r>
+              <a:rPr lang="en-US" altLang="ko-KR" sz="800" dirty="0">
+                <a:latin typeface="LG Smart UI Regular" panose="020B0500000101010101" pitchFamily="34" charset="-127"/>
+                <a:ea typeface="LG Smart UI Regular" panose="020B0500000101010101" pitchFamily="34" charset="-127"/>
+              </a:rPr>
+              <a:t>: </a:t>
+            </a:r>
+            <a:r>
+              <a:rPr lang="en-US" altLang="ko-KR" sz="800" dirty="0">
+                <a:latin typeface="LG Smart UI Regular" panose="020B0500000101010101" pitchFamily="34" charset="-127"/>
+                <a:ea typeface="LG Smart UI Regular" panose="020B0500000101010101" pitchFamily="34" charset="-127"/>
+                <a:hlinkClick r:id="rId3"/>
+              </a:rPr>
+              <a:t>https://drive.google.com/drive/folders/1AXFPK7xQpnUrl42ke9HL9YrVziXlabm1?usp=sharing</a:t>
+            </a:r>
+            <a:br>
+              <a:rPr lang="en-US" altLang="ko-KR" sz="800" dirty="0">
+                <a:latin typeface="LG Smart UI Regular" panose="020B0500000101010101" pitchFamily="34" charset="-127"/>
+                <a:ea typeface="LG Smart UI Regular" panose="020B0500000101010101" pitchFamily="34" charset="-127"/>
+              </a:rPr>
+            </a:br>
+            <a:r>
+              <a:rPr lang="en-US" altLang="ko-KR" sz="800" dirty="0">
+                <a:latin typeface="LG Smart UI Regular" panose="020B0500000101010101" pitchFamily="34" charset="-127"/>
+                <a:ea typeface="LG Smart UI Regular" panose="020B0500000101010101" pitchFamily="34" charset="-127"/>
+              </a:rPr>
+              <a:t>E-Mail: alwayzhan@gmail.com</a:t>
             </a:r>
           </a:p>
         </p:txBody>
@@ -39702,12 +39807,11 @@
             </a:endParaRPr>
           </a:p>
           <a:p>
-            <a:pPr marL="742950" lvl="1" indent="-285750">
+            <a:pPr marL="457200" lvl="1" indent="0">
               <a:lnSpc>
                 <a:spcPct val="100000"/>
               </a:lnSpc>
-              <a:buFontTx/>
-              <a:buChar char="-"/>
+              <a:buNone/>
             </a:pPr>
             <a:endParaRPr lang="en-US" altLang="ko-KR" sz="1200" dirty="0">
               <a:latin typeface="LG Smart UI Regular" panose="020B0500000101010101" pitchFamily="34" charset="-127"/>
@@ -40055,7 +40159,7 @@
         </p:blipFill>
         <p:spPr>
           <a:xfrm rot="18247540">
-            <a:off x="3140713" y="3163936"/>
+            <a:off x="2709612" y="3159576"/>
             <a:ext cx="914400" cy="914400"/>
           </a:xfrm>
           <a:prstGeom prst="rect">
@@ -40091,7 +40195,7 @@
         </p:blipFill>
         <p:spPr>
           <a:xfrm rot="3510482">
-            <a:off x="1370692" y="3574500"/>
+            <a:off x="939591" y="3570140"/>
             <a:ext cx="914400" cy="914400"/>
           </a:xfrm>
           <a:prstGeom prst="rect">
@@ -40115,7 +40219,7 @@
         </p:nvCxnSpPr>
         <p:spPr>
           <a:xfrm flipV="1">
-            <a:off x="930505" y="2986167"/>
+            <a:off x="499404" y="2981807"/>
             <a:ext cx="2552054" cy="1571218"/>
           </a:xfrm>
           <a:prstGeom prst="line">
@@ -40160,7 +40264,7 @@
         </p:nvCxnSpPr>
         <p:spPr>
           <a:xfrm>
-            <a:off x="2483423" y="2883087"/>
+            <a:off x="2052322" y="2878727"/>
             <a:ext cx="2093474" cy="1405614"/>
           </a:xfrm>
           <a:prstGeom prst="line">
@@ -40205,7 +40309,7 @@
         </p:nvCxnSpPr>
         <p:spPr>
           <a:xfrm flipV="1">
-            <a:off x="1827892" y="3621136"/>
+            <a:off x="1396791" y="3616776"/>
             <a:ext cx="1770021" cy="425234"/>
           </a:xfrm>
           <a:prstGeom prst="line">
@@ -40250,7 +40354,7 @@
         </p:nvSpPr>
         <p:spPr>
           <a:xfrm>
-            <a:off x="2291160" y="3636220"/>
+            <a:off x="1860059" y="3631860"/>
             <a:ext cx="601855" cy="246221"/>
           </a:xfrm>
           <a:prstGeom prst="rect">
@@ -40286,7 +40390,7 @@
         </p:nvSpPr>
         <p:spPr>
           <a:xfrm rot="1098746">
-            <a:off x="2063908" y="3750993"/>
+            <a:off x="1632807" y="3746633"/>
             <a:ext cx="273629" cy="289058"/>
           </a:xfrm>
           <a:prstGeom prst="arc">
@@ -40699,7 +40803,7 @@
         </p:nvSpPr>
         <p:spPr>
           <a:xfrm>
-            <a:off x="3495147" y="3781906"/>
+            <a:off x="3064046" y="3777546"/>
             <a:ext cx="627833" cy="246221"/>
           </a:xfrm>
           <a:prstGeom prst="rect">
@@ -40735,7 +40839,7 @@
         </p:nvSpPr>
         <p:spPr>
           <a:xfrm rot="9308940">
-            <a:off x="3427814" y="3433218"/>
+            <a:off x="2996713" y="3428858"/>
             <a:ext cx="433259" cy="315131"/>
           </a:xfrm>
           <a:prstGeom prst="arc">
@@ -40779,7 +40883,7 @@
         </p:nvSpPr>
         <p:spPr>
           <a:xfrm rot="3252660">
-            <a:off x="3431204" y="2922483"/>
+            <a:off x="3000103" y="2918123"/>
             <a:ext cx="156337" cy="103080"/>
           </a:xfrm>
           <a:prstGeom prst="triangle">
@@ -40825,7 +40929,7 @@
         </p:nvSpPr>
         <p:spPr>
           <a:xfrm rot="7592393">
-            <a:off x="4560498" y="4297692"/>
+            <a:off x="4129397" y="4293332"/>
             <a:ext cx="156337" cy="103080"/>
           </a:xfrm>
           <a:prstGeom prst="triangle">
@@ -40879,7 +40983,7 @@
         </p:nvSpPr>
         <p:spPr>
           <a:xfrm>
-            <a:off x="3364886" y="2720124"/>
+            <a:off x="2933785" y="2715764"/>
             <a:ext cx="953356" cy="215444"/>
           </a:xfrm>
           <a:prstGeom prst="rect">
@@ -40918,7 +41022,7 @@
         </p:nvSpPr>
         <p:spPr>
           <a:xfrm>
-            <a:off x="4249939" y="4461175"/>
+            <a:off x="3713856" y="4373839"/>
             <a:ext cx="953356" cy="215444"/>
           </a:xfrm>
           <a:prstGeom prst="rect">
@@ -40934,7 +41038,7 @@
           <a:p>
             <a:r>
               <a:rPr lang="ko-KR" altLang="en-US" sz="800" b="1" dirty="0"/>
-              <a:t>꼬리 방향</a:t>
+              <a:t>적의 꼬리 방향</a:t>
             </a:r>
           </a:p>
         </p:txBody>
@@ -41023,7 +41127,7 @@
           <a:p>
             <a:r>
               <a:rPr lang="ko-KR" altLang="en-US" sz="800" b="1" dirty="0"/>
-              <a:t>꼬리 방향</a:t>
+              <a:t>적의 꼬리 방향</a:t>
             </a:r>
           </a:p>
         </p:txBody>
@@ -41127,7 +41231,7 @@
         </p:nvSpPr>
         <p:spPr>
           <a:xfrm rot="18478847">
-            <a:off x="2344264" y="2790697"/>
+            <a:off x="1913163" y="2786337"/>
             <a:ext cx="156337" cy="103080"/>
           </a:xfrm>
           <a:prstGeom prst="triangle">
@@ -41183,8 +41287,8 @@
         </p:nvSpPr>
         <p:spPr>
           <a:xfrm>
-            <a:off x="525695" y="4427342"/>
-            <a:ext cx="4677600" cy="434560"/>
+            <a:off x="247370" y="4344867"/>
+            <a:ext cx="4012365" cy="434560"/>
           </a:xfrm>
           <a:prstGeom prst="rect">
             <a:avLst/>
@@ -41491,7 +41595,7 @@
         </p:nvSpPr>
         <p:spPr>
           <a:xfrm>
-            <a:off x="4385713" y="4440643"/>
+            <a:off x="4446646" y="4314413"/>
             <a:ext cx="4677600" cy="434560"/>
           </a:xfrm>
           <a:prstGeom prst="rect">
@@ -41847,7 +41951,7 @@
         </p:nvCxnSpPr>
         <p:spPr>
           <a:xfrm>
-            <a:off x="763299" y="4149278"/>
+            <a:off x="332198" y="4144918"/>
             <a:ext cx="3963318" cy="0"/>
           </a:xfrm>
           <a:prstGeom prst="line">
@@ -41981,7 +42085,7 @@
         </p:nvSpPr>
         <p:spPr>
           <a:xfrm>
-            <a:off x="4221067" y="3821168"/>
+            <a:off x="3789966" y="3816808"/>
             <a:ext cx="1124413" cy="215444"/>
           </a:xfrm>
           <a:prstGeom prst="rect">
@@ -42021,7 +42125,7 @@
         </p:nvSpPr>
         <p:spPr>
           <a:xfrm>
-            <a:off x="3974137" y="4013489"/>
+            <a:off x="3543036" y="4009129"/>
             <a:ext cx="500347" cy="289058"/>
           </a:xfrm>
           <a:prstGeom prst="arc">

</xml_diff>